<commit_message>
Done, turned in for final grade
</commit_message>
<xml_diff>
--- a/textures/Title Screen.pptx
+++ b/textures/Title Screen.pptx
@@ -7,6 +7,8 @@
   <p:sldIdLst>
     <p:sldId id="256" r:id="rId2"/>
     <p:sldId id="257" r:id="rId3"/>
+    <p:sldId id="259" r:id="rId4"/>
+    <p:sldId id="260" r:id="rId5"/>
   </p:sldIdLst>
   <p:sldSz cx="7620000" cy="7620000"/>
   <p:notesSz cx="6858000" cy="9144000"/>
@@ -244,7 +246,7 @@
           <a:p>
             <a:fld id="{BDA538A8-C4AB-4A7D-99C3-2B9F281B47BA}" type="datetimeFigureOut">
               <a:rPr lang="en-US" smtClean="0"/>
-              <a:t>4/21/2018</a:t>
+              <a:t>4/24/2018</a:t>
             </a:fld>
             <a:endParaRPr lang="en-US"/>
           </a:p>
@@ -414,7 +416,7 @@
           <a:p>
             <a:fld id="{BDA538A8-C4AB-4A7D-99C3-2B9F281B47BA}" type="datetimeFigureOut">
               <a:rPr lang="en-US" smtClean="0"/>
-              <a:t>4/21/2018</a:t>
+              <a:t>4/24/2018</a:t>
             </a:fld>
             <a:endParaRPr lang="en-US"/>
           </a:p>
@@ -594,7 +596,7 @@
           <a:p>
             <a:fld id="{BDA538A8-C4AB-4A7D-99C3-2B9F281B47BA}" type="datetimeFigureOut">
               <a:rPr lang="en-US" smtClean="0"/>
-              <a:t>4/21/2018</a:t>
+              <a:t>4/24/2018</a:t>
             </a:fld>
             <a:endParaRPr lang="en-US"/>
           </a:p>
@@ -764,7 +766,7 @@
           <a:p>
             <a:fld id="{BDA538A8-C4AB-4A7D-99C3-2B9F281B47BA}" type="datetimeFigureOut">
               <a:rPr lang="en-US" smtClean="0"/>
-              <a:t>4/21/2018</a:t>
+              <a:t>4/24/2018</a:t>
             </a:fld>
             <a:endParaRPr lang="en-US"/>
           </a:p>
@@ -1008,7 +1010,7 @@
           <a:p>
             <a:fld id="{BDA538A8-C4AB-4A7D-99C3-2B9F281B47BA}" type="datetimeFigureOut">
               <a:rPr lang="en-US" smtClean="0"/>
-              <a:t>4/21/2018</a:t>
+              <a:t>4/24/2018</a:t>
             </a:fld>
             <a:endParaRPr lang="en-US"/>
           </a:p>
@@ -1240,7 +1242,7 @@
           <a:p>
             <a:fld id="{BDA538A8-C4AB-4A7D-99C3-2B9F281B47BA}" type="datetimeFigureOut">
               <a:rPr lang="en-US" smtClean="0"/>
-              <a:t>4/21/2018</a:t>
+              <a:t>4/24/2018</a:t>
             </a:fld>
             <a:endParaRPr lang="en-US"/>
           </a:p>
@@ -1607,7 +1609,7 @@
           <a:p>
             <a:fld id="{BDA538A8-C4AB-4A7D-99C3-2B9F281B47BA}" type="datetimeFigureOut">
               <a:rPr lang="en-US" smtClean="0"/>
-              <a:t>4/21/2018</a:t>
+              <a:t>4/24/2018</a:t>
             </a:fld>
             <a:endParaRPr lang="en-US"/>
           </a:p>
@@ -1725,7 +1727,7 @@
           <a:p>
             <a:fld id="{BDA538A8-C4AB-4A7D-99C3-2B9F281B47BA}" type="datetimeFigureOut">
               <a:rPr lang="en-US" smtClean="0"/>
-              <a:t>4/21/2018</a:t>
+              <a:t>4/24/2018</a:t>
             </a:fld>
             <a:endParaRPr lang="en-US"/>
           </a:p>
@@ -1820,7 +1822,7 @@
           <a:p>
             <a:fld id="{BDA538A8-C4AB-4A7D-99C3-2B9F281B47BA}" type="datetimeFigureOut">
               <a:rPr lang="en-US" smtClean="0"/>
-              <a:t>4/21/2018</a:t>
+              <a:t>4/24/2018</a:t>
             </a:fld>
             <a:endParaRPr lang="en-US"/>
           </a:p>
@@ -2097,7 +2099,7 @@
           <a:p>
             <a:fld id="{BDA538A8-C4AB-4A7D-99C3-2B9F281B47BA}" type="datetimeFigureOut">
               <a:rPr lang="en-US" smtClean="0"/>
-              <a:t>4/21/2018</a:t>
+              <a:t>4/24/2018</a:t>
             </a:fld>
             <a:endParaRPr lang="en-US"/>
           </a:p>
@@ -2354,7 +2356,7 @@
           <a:p>
             <a:fld id="{BDA538A8-C4AB-4A7D-99C3-2B9F281B47BA}" type="datetimeFigureOut">
               <a:rPr lang="en-US" smtClean="0"/>
-              <a:t>4/21/2018</a:t>
+              <a:t>4/24/2018</a:t>
             </a:fld>
             <a:endParaRPr lang="en-US"/>
           </a:p>
@@ -2577,7 +2579,7 @@
           <a:p>
             <a:fld id="{BDA538A8-C4AB-4A7D-99C3-2B9F281B47BA}" type="datetimeFigureOut">
               <a:rPr lang="en-US" smtClean="0"/>
-              <a:t>4/21/2018</a:t>
+              <a:t>4/24/2018</a:t>
             </a:fld>
             <a:endParaRPr lang="en-US"/>
           </a:p>
@@ -3554,11 +3556,7 @@
           <a:p>
             <a:r>
               <a:rPr lang="en-US" sz="1600" dirty="0" smtClean="0"/>
-              <a:t>Chase the mouse with the cat! Help the mouse run </a:t>
-            </a:r>
-            <a:r>
-              <a:rPr lang="en-US" sz="1600" dirty="0" smtClean="0"/>
-              <a:t>away!</a:t>
+              <a:t>Chase the mouse with the cat! Help the mouse run away!</a:t>
             </a:r>
           </a:p>
           <a:p>
@@ -3574,17 +3572,8 @@
             </a:pPr>
             <a:r>
               <a:rPr lang="en-US" sz="1600" dirty="0" smtClean="0"/>
-              <a:t>Use </a:t>
-            </a:r>
-            <a:r>
-              <a:rPr lang="en-US" sz="1600" dirty="0" smtClean="0"/>
-              <a:t>WASD to move the </a:t>
-            </a:r>
-            <a:r>
-              <a:rPr lang="en-US" sz="1600" dirty="0" smtClean="0"/>
-              <a:t>cat, get close to the mouse to catch it!</a:t>
-            </a:r>
-            <a:endParaRPr lang="en-US" sz="1600" dirty="0" smtClean="0"/>
+              <a:t>Use WASD to move the cat, get close to the mouse to catch it!</a:t>
+            </a:r>
           </a:p>
           <a:p>
             <a:pPr marL="603863" lvl="1" indent="-238127">
@@ -3596,17 +3585,8 @@
             </a:pPr>
             <a:r>
               <a:rPr lang="en-US" sz="1600" dirty="0" smtClean="0"/>
-              <a:t>Use Arrow keys to move </a:t>
-            </a:r>
-            <a:r>
-              <a:rPr lang="en-US" sz="1600" dirty="0" smtClean="0"/>
-              <a:t>mouse</a:t>
-            </a:r>
-            <a:r>
-              <a:rPr lang="en-US" sz="1600" dirty="0" smtClean="0"/>
-              <a:t>, escape through the hole in the wall!</a:t>
-            </a:r>
-            <a:endParaRPr lang="en-US" sz="1600" dirty="0" smtClean="0"/>
+              <a:t>Use Arrow keys to move mouse, escape through the hole in the wall!</a:t>
+            </a:r>
           </a:p>
           <a:p>
             <a:pPr marL="603863" lvl="1" indent="-238127">
@@ -3618,21 +3598,8 @@
             </a:pPr>
             <a:r>
               <a:rPr lang="en-US" sz="1600" dirty="0" smtClean="0"/>
-              <a:t>Use </a:t>
-            </a:r>
-            <a:r>
-              <a:rPr lang="en-US" sz="1600" dirty="0" smtClean="0"/>
-              <a:t>R </a:t>
-            </a:r>
-            <a:r>
-              <a:rPr lang="en-US" sz="1600" dirty="0" smtClean="0"/>
-              <a:t>to </a:t>
-            </a:r>
-            <a:r>
-              <a:rPr lang="en-US" sz="1600" dirty="0" smtClean="0"/>
-              <a:t>reset animals</a:t>
-            </a:r>
-            <a:endParaRPr lang="en-US" sz="1600" dirty="0" smtClean="0"/>
+              <a:t>Use R to reset animals</a:t>
+            </a:r>
           </a:p>
           <a:p>
             <a:pPr marL="603863" lvl="1" indent="-238127">
@@ -3665,11 +3632,7 @@
           <a:p>
             <a:r>
               <a:rPr lang="en-US" sz="1600" dirty="0" smtClean="0"/>
-              <a:t>F1 </a:t>
-            </a:r>
-            <a:r>
-              <a:rPr lang="en-US" sz="1600" dirty="0" smtClean="0"/>
-              <a:t>to display instructions</a:t>
+              <a:t>F1 to display instructions</a:t>
             </a:r>
             <a:endParaRPr lang="en-US" sz="1600" dirty="0"/>
           </a:p>
@@ -4076,6 +4039,948 @@
     <p:extLst>
       <p:ext uri="{BB962C8B-B14F-4D97-AF65-F5344CB8AC3E}">
         <p14:creationId xmlns:p14="http://schemas.microsoft.com/office/powerpoint/2010/main" val="816895360"/>
+      </p:ext>
+    </p:extLst>
+  </p:cSld>
+  <p:clrMapOvr>
+    <a:masterClrMapping/>
+  </p:clrMapOvr>
+  <p:timing>
+    <p:tnLst>
+      <p:par>
+        <p:cTn id="1" dur="indefinite" restart="never" nodeType="tmRoot"/>
+      </p:par>
+    </p:tnLst>
+  </p:timing>
+</p:sld>
+</file>
+
+<file path=ppt/slides/slide3.xml><?xml version="1.0" encoding="utf-8"?>
+<p:sld xmlns:a="http://schemas.openxmlformats.org/drawingml/2006/main" xmlns:r="http://schemas.openxmlformats.org/officeDocument/2006/relationships" xmlns:p="http://schemas.openxmlformats.org/presentationml/2006/main">
+  <p:cSld>
+    <p:spTree>
+      <p:nvGrpSpPr>
+        <p:cNvPr id="1" name=""/>
+        <p:cNvGrpSpPr/>
+        <p:nvPr/>
+      </p:nvGrpSpPr>
+      <p:grpSpPr>
+        <a:xfrm>
+          <a:off x="0" y="0"/>
+          <a:ext cx="0" cy="0"/>
+          <a:chOff x="0" y="0"/>
+          <a:chExt cx="0" cy="0"/>
+        </a:xfrm>
+      </p:grpSpPr>
+      <p:sp>
+        <p:nvSpPr>
+          <p:cNvPr id="5" name="TextBox 4"/>
+          <p:cNvSpPr txBox="1"/>
+          <p:nvPr/>
+        </p:nvSpPr>
+        <p:spPr>
+          <a:xfrm>
+            <a:off x="386861" y="3065691"/>
+            <a:ext cx="7158182" cy="690830"/>
+          </a:xfrm>
+          <a:prstGeom prst="rect">
+            <a:avLst/>
+          </a:prstGeom>
+          <a:noFill/>
+        </p:spPr>
+        <p:txBody>
+          <a:bodyPr wrap="square" rtlCol="0">
+            <a:spAutoFit/>
+          </a:bodyPr>
+          <a:lstStyle/>
+          <a:p>
+            <a:pPr algn="ctr"/>
+            <a:r>
+              <a:rPr lang="en-US" sz="3889" b="1" u="sng" dirty="0" smtClean="0"/>
+              <a:t>Cat Won!</a:t>
+            </a:r>
+            <a:endParaRPr lang="en-US" sz="3889" b="1" u="sng" dirty="0"/>
+          </a:p>
+        </p:txBody>
+      </p:sp>
+      <p:pic>
+        <p:nvPicPr>
+          <p:cNvPr id="3" name="Picture 2"/>
+          <p:cNvPicPr>
+            <a:picLocks noChangeAspect="1"/>
+          </p:cNvPicPr>
+          <p:nvPr/>
+        </p:nvPicPr>
+        <p:blipFill rotWithShape="1">
+          <a:blip r:embed="rId2">
+            <a:extLst>
+              <a:ext uri="{28A0092B-C50C-407E-A947-70E740481C1C}">
+                <a14:useLocalDpi xmlns:a14="http://schemas.microsoft.com/office/drawing/2010/main" val="0"/>
+              </a:ext>
+            </a:extLst>
+          </a:blip>
+          <a:srcRect r="13045" b="83714"/>
+          <a:stretch/>
+        </p:blipFill>
+        <p:spPr>
+          <a:xfrm>
+            <a:off x="0" y="55821"/>
+            <a:ext cx="5717406" cy="796228"/>
+          </a:xfrm>
+          <a:prstGeom prst="rect">
+            <a:avLst/>
+          </a:prstGeom>
+        </p:spPr>
+      </p:pic>
+      <p:pic>
+        <p:nvPicPr>
+          <p:cNvPr id="11" name="Picture 10"/>
+          <p:cNvPicPr>
+            <a:picLocks noChangeAspect="1"/>
+          </p:cNvPicPr>
+          <p:nvPr/>
+        </p:nvPicPr>
+        <p:blipFill rotWithShape="1">
+          <a:blip r:embed="rId2">
+            <a:extLst>
+              <a:ext uri="{28A0092B-C50C-407E-A947-70E740481C1C}">
+                <a14:useLocalDpi xmlns:a14="http://schemas.microsoft.com/office/drawing/2010/main" val="0"/>
+              </a:ext>
+            </a:extLst>
+          </a:blip>
+          <a:srcRect l="86617" b="83714"/>
+          <a:stretch/>
+        </p:blipFill>
+        <p:spPr>
+          <a:xfrm>
+            <a:off x="6706962" y="89598"/>
+            <a:ext cx="879935" cy="796228"/>
+          </a:xfrm>
+          <a:prstGeom prst="rect">
+            <a:avLst/>
+          </a:prstGeom>
+        </p:spPr>
+      </p:pic>
+      <p:pic>
+        <p:nvPicPr>
+          <p:cNvPr id="12" name="Picture 11"/>
+          <p:cNvPicPr>
+            <a:picLocks noChangeAspect="1"/>
+          </p:cNvPicPr>
+          <p:nvPr/>
+        </p:nvPicPr>
+        <p:blipFill rotWithShape="1">
+          <a:blip r:embed="rId2">
+            <a:extLst>
+              <a:ext uri="{28A0092B-C50C-407E-A947-70E740481C1C}">
+                <a14:useLocalDpi xmlns:a14="http://schemas.microsoft.com/office/drawing/2010/main" val="0"/>
+              </a:ext>
+            </a:extLst>
+          </a:blip>
+          <a:srcRect l="72675" r="13045" b="83714"/>
+          <a:stretch/>
+        </p:blipFill>
+        <p:spPr>
+          <a:xfrm>
+            <a:off x="5742703" y="79803"/>
+            <a:ext cx="938961" cy="796228"/>
+          </a:xfrm>
+          <a:prstGeom prst="rect">
+            <a:avLst/>
+          </a:prstGeom>
+        </p:spPr>
+      </p:pic>
+      <p:pic>
+        <p:nvPicPr>
+          <p:cNvPr id="13" name="Picture 12"/>
+          <p:cNvPicPr>
+            <a:picLocks noChangeAspect="1"/>
+          </p:cNvPicPr>
+          <p:nvPr/>
+        </p:nvPicPr>
+        <p:blipFill rotWithShape="1">
+          <a:blip r:embed="rId2">
+            <a:extLst>
+              <a:ext uri="{28A0092B-C50C-407E-A947-70E740481C1C}">
+                <a14:useLocalDpi xmlns:a14="http://schemas.microsoft.com/office/drawing/2010/main" val="0"/>
+              </a:ext>
+            </a:extLst>
+          </a:blip>
+          <a:srcRect l="12156" r="13045" b="83714"/>
+          <a:stretch/>
+        </p:blipFill>
+        <p:spPr>
+          <a:xfrm rot="16200000">
+            <a:off x="-1934697" y="2958047"/>
+            <a:ext cx="4918129" cy="796228"/>
+          </a:xfrm>
+          <a:prstGeom prst="rect">
+            <a:avLst/>
+          </a:prstGeom>
+        </p:spPr>
+      </p:pic>
+      <p:pic>
+        <p:nvPicPr>
+          <p:cNvPr id="14" name="Picture 13"/>
+          <p:cNvPicPr>
+            <a:picLocks noChangeAspect="1"/>
+          </p:cNvPicPr>
+          <p:nvPr/>
+        </p:nvPicPr>
+        <p:blipFill rotWithShape="1">
+          <a:blip r:embed="rId2">
+            <a:extLst>
+              <a:ext uri="{28A0092B-C50C-407E-A947-70E740481C1C}">
+                <a14:useLocalDpi xmlns:a14="http://schemas.microsoft.com/office/drawing/2010/main" val="0"/>
+              </a:ext>
+            </a:extLst>
+          </a:blip>
+          <a:srcRect l="12156" r="13045" b="83714"/>
+          <a:stretch/>
+        </p:blipFill>
+        <p:spPr>
+          <a:xfrm rot="5400000">
+            <a:off x="4687865" y="3033445"/>
+            <a:ext cx="4918129" cy="796228"/>
+          </a:xfrm>
+          <a:prstGeom prst="rect">
+            <a:avLst/>
+          </a:prstGeom>
+        </p:spPr>
+      </p:pic>
+      <p:pic>
+        <p:nvPicPr>
+          <p:cNvPr id="15" name="Picture 14"/>
+          <p:cNvPicPr>
+            <a:picLocks noChangeAspect="1"/>
+          </p:cNvPicPr>
+          <p:nvPr/>
+        </p:nvPicPr>
+        <p:blipFill rotWithShape="1">
+          <a:blip r:embed="rId2">
+            <a:extLst>
+              <a:ext uri="{28A0092B-C50C-407E-A947-70E740481C1C}">
+                <a14:useLocalDpi xmlns:a14="http://schemas.microsoft.com/office/drawing/2010/main" val="0"/>
+              </a:ext>
+            </a:extLst>
+          </a:blip>
+          <a:srcRect l="12156" r="13045" b="83714"/>
+          <a:stretch/>
+        </p:blipFill>
+        <p:spPr>
+          <a:xfrm rot="10800000">
+            <a:off x="1019176" y="6741865"/>
+            <a:ext cx="4918129" cy="796228"/>
+          </a:xfrm>
+          <a:prstGeom prst="rect">
+            <a:avLst/>
+          </a:prstGeom>
+        </p:spPr>
+      </p:pic>
+      <p:pic>
+        <p:nvPicPr>
+          <p:cNvPr id="16" name="Picture 15"/>
+          <p:cNvPicPr>
+            <a:picLocks noChangeAspect="1"/>
+          </p:cNvPicPr>
+          <p:nvPr/>
+        </p:nvPicPr>
+        <p:blipFill rotWithShape="1">
+          <a:blip r:embed="rId2">
+            <a:extLst>
+              <a:ext uri="{28A0092B-C50C-407E-A947-70E740481C1C}">
+                <a14:useLocalDpi xmlns:a14="http://schemas.microsoft.com/office/drawing/2010/main" val="0"/>
+              </a:ext>
+            </a:extLst>
+          </a:blip>
+          <a:srcRect l="72675" r="13045" b="83714"/>
+          <a:stretch/>
+        </p:blipFill>
+        <p:spPr>
+          <a:xfrm rot="16200000">
+            <a:off x="67537" y="5874270"/>
+            <a:ext cx="938961" cy="796228"/>
+          </a:xfrm>
+          <a:prstGeom prst="rect">
+            <a:avLst/>
+          </a:prstGeom>
+        </p:spPr>
+      </p:pic>
+      <p:pic>
+        <p:nvPicPr>
+          <p:cNvPr id="17" name="Picture 16"/>
+          <p:cNvPicPr>
+            <a:picLocks noChangeAspect="1"/>
+          </p:cNvPicPr>
+          <p:nvPr/>
+        </p:nvPicPr>
+        <p:blipFill rotWithShape="1">
+          <a:blip r:embed="rId2">
+            <a:extLst>
+              <a:ext uri="{28A0092B-C50C-407E-A947-70E740481C1C}">
+                <a14:useLocalDpi xmlns:a14="http://schemas.microsoft.com/office/drawing/2010/main" val="0"/>
+              </a:ext>
+            </a:extLst>
+          </a:blip>
+          <a:srcRect l="72675" r="13045" b="83714"/>
+          <a:stretch/>
+        </p:blipFill>
+        <p:spPr>
+          <a:xfrm rot="10800000">
+            <a:off x="5905896" y="6747773"/>
+            <a:ext cx="938961" cy="796228"/>
+          </a:xfrm>
+          <a:prstGeom prst="rect">
+            <a:avLst/>
+          </a:prstGeom>
+        </p:spPr>
+      </p:pic>
+      <p:pic>
+        <p:nvPicPr>
+          <p:cNvPr id="18" name="Picture 17"/>
+          <p:cNvPicPr>
+            <a:picLocks noChangeAspect="1"/>
+          </p:cNvPicPr>
+          <p:nvPr/>
+        </p:nvPicPr>
+        <p:blipFill rotWithShape="1">
+          <a:blip r:embed="rId2">
+            <a:extLst>
+              <a:ext uri="{28A0092B-C50C-407E-A947-70E740481C1C}">
+                <a14:useLocalDpi xmlns:a14="http://schemas.microsoft.com/office/drawing/2010/main" val="0"/>
+              </a:ext>
+            </a:extLst>
+          </a:blip>
+          <a:srcRect l="72675" r="13045" b="83714"/>
+          <a:stretch/>
+        </p:blipFill>
+        <p:spPr>
+          <a:xfrm rot="5400000">
+            <a:off x="6677448" y="5921084"/>
+            <a:ext cx="938961" cy="796228"/>
+          </a:xfrm>
+          <a:prstGeom prst="rect">
+            <a:avLst/>
+          </a:prstGeom>
+        </p:spPr>
+      </p:pic>
+      <p:pic>
+        <p:nvPicPr>
+          <p:cNvPr id="19" name="Picture 18"/>
+          <p:cNvPicPr>
+            <a:picLocks noChangeAspect="1"/>
+          </p:cNvPicPr>
+          <p:nvPr/>
+        </p:nvPicPr>
+        <p:blipFill rotWithShape="1">
+          <a:blip r:embed="rId2">
+            <a:extLst>
+              <a:ext uri="{28A0092B-C50C-407E-A947-70E740481C1C}">
+                <a14:useLocalDpi xmlns:a14="http://schemas.microsoft.com/office/drawing/2010/main" val="0"/>
+              </a:ext>
+            </a:extLst>
+          </a:blip>
+          <a:srcRect l="86617" b="83714"/>
+          <a:stretch/>
+        </p:blipFill>
+        <p:spPr>
+          <a:xfrm>
+            <a:off x="6736226" y="6788679"/>
+            <a:ext cx="879935" cy="796228"/>
+          </a:xfrm>
+          <a:prstGeom prst="rect">
+            <a:avLst/>
+          </a:prstGeom>
+        </p:spPr>
+      </p:pic>
+      <p:pic>
+        <p:nvPicPr>
+          <p:cNvPr id="20" name="Picture 19"/>
+          <p:cNvPicPr>
+            <a:picLocks noChangeAspect="1"/>
+          </p:cNvPicPr>
+          <p:nvPr/>
+        </p:nvPicPr>
+        <p:blipFill rotWithShape="1">
+          <a:blip r:embed="rId2">
+            <a:extLst>
+              <a:ext uri="{28A0092B-C50C-407E-A947-70E740481C1C}">
+                <a14:useLocalDpi xmlns:a14="http://schemas.microsoft.com/office/drawing/2010/main" val="0"/>
+              </a:ext>
+            </a:extLst>
+          </a:blip>
+          <a:srcRect l="86617" b="83714"/>
+          <a:stretch/>
+        </p:blipFill>
+        <p:spPr>
+          <a:xfrm>
+            <a:off x="-2827" y="6822425"/>
+            <a:ext cx="879935" cy="796228"/>
+          </a:xfrm>
+          <a:prstGeom prst="rect">
+            <a:avLst/>
+          </a:prstGeom>
+        </p:spPr>
+      </p:pic>
+      <p:sp>
+        <p:nvSpPr>
+          <p:cNvPr id="21" name="TextBox 20"/>
+          <p:cNvSpPr txBox="1"/>
+          <p:nvPr/>
+        </p:nvSpPr>
+        <p:spPr>
+          <a:xfrm>
+            <a:off x="960431" y="6030582"/>
+            <a:ext cx="3357978" cy="690830"/>
+          </a:xfrm>
+          <a:prstGeom prst="rect">
+            <a:avLst/>
+          </a:prstGeom>
+          <a:solidFill>
+            <a:schemeClr val="bg1"/>
+          </a:solidFill>
+          <a:ln>
+            <a:solidFill>
+              <a:schemeClr val="tx1"/>
+            </a:solidFill>
+          </a:ln>
+        </p:spPr>
+        <p:txBody>
+          <a:bodyPr wrap="square" rtlCol="0">
+            <a:spAutoFit/>
+          </a:bodyPr>
+          <a:lstStyle/>
+          <a:p>
+            <a:pPr algn="ctr"/>
+            <a:r>
+              <a:rPr lang="en-US" sz="3889" b="1" dirty="0" smtClean="0"/>
+              <a:t>EXIT</a:t>
+            </a:r>
+            <a:endParaRPr lang="en-US" sz="3889" b="1" dirty="0"/>
+          </a:p>
+        </p:txBody>
+      </p:sp>
+      <p:sp>
+        <p:nvSpPr>
+          <p:cNvPr id="22" name="TextBox 21"/>
+          <p:cNvSpPr txBox="1"/>
+          <p:nvPr/>
+        </p:nvSpPr>
+        <p:spPr>
+          <a:xfrm>
+            <a:off x="4460476" y="6030582"/>
+            <a:ext cx="2568973" cy="707886"/>
+          </a:xfrm>
+          <a:prstGeom prst="rect">
+            <a:avLst/>
+          </a:prstGeom>
+          <a:solidFill>
+            <a:schemeClr val="bg1"/>
+          </a:solidFill>
+          <a:ln>
+            <a:solidFill>
+              <a:schemeClr val="tx1"/>
+            </a:solidFill>
+          </a:ln>
+        </p:spPr>
+        <p:txBody>
+          <a:bodyPr wrap="square" rtlCol="0">
+            <a:spAutoFit/>
+          </a:bodyPr>
+          <a:lstStyle/>
+          <a:p>
+            <a:pPr algn="ctr"/>
+            <a:r>
+              <a:rPr lang="en-US" sz="4000" b="1" dirty="0" smtClean="0"/>
+              <a:t>PLAY</a:t>
+            </a:r>
+            <a:r>
+              <a:rPr lang="en-US" sz="3600" b="1" dirty="0" smtClean="0"/>
+              <a:t> AGAIN</a:t>
+            </a:r>
+            <a:endParaRPr lang="en-US" sz="3600" b="1" dirty="0"/>
+          </a:p>
+        </p:txBody>
+      </p:sp>
+    </p:spTree>
+    <p:extLst>
+      <p:ext uri="{BB962C8B-B14F-4D97-AF65-F5344CB8AC3E}">
+        <p14:creationId xmlns:p14="http://schemas.microsoft.com/office/powerpoint/2010/main" val="798049621"/>
+      </p:ext>
+    </p:extLst>
+  </p:cSld>
+  <p:clrMapOvr>
+    <a:masterClrMapping/>
+  </p:clrMapOvr>
+  <p:timing>
+    <p:tnLst>
+      <p:par>
+        <p:cTn id="1" dur="indefinite" restart="never" nodeType="tmRoot"/>
+      </p:par>
+    </p:tnLst>
+  </p:timing>
+</p:sld>
+</file>
+
+<file path=ppt/slides/slide4.xml><?xml version="1.0" encoding="utf-8"?>
+<p:sld xmlns:a="http://schemas.openxmlformats.org/drawingml/2006/main" xmlns:r="http://schemas.openxmlformats.org/officeDocument/2006/relationships" xmlns:p="http://schemas.openxmlformats.org/presentationml/2006/main">
+  <p:cSld>
+    <p:spTree>
+      <p:nvGrpSpPr>
+        <p:cNvPr id="1" name=""/>
+        <p:cNvGrpSpPr/>
+        <p:nvPr/>
+      </p:nvGrpSpPr>
+      <p:grpSpPr>
+        <a:xfrm>
+          <a:off x="0" y="0"/>
+          <a:ext cx="0" cy="0"/>
+          <a:chOff x="0" y="0"/>
+          <a:chExt cx="0" cy="0"/>
+        </a:xfrm>
+      </p:grpSpPr>
+      <p:sp>
+        <p:nvSpPr>
+          <p:cNvPr id="5" name="TextBox 4"/>
+          <p:cNvSpPr txBox="1"/>
+          <p:nvPr/>
+        </p:nvSpPr>
+        <p:spPr>
+          <a:xfrm>
+            <a:off x="386861" y="3065691"/>
+            <a:ext cx="7158182" cy="690830"/>
+          </a:xfrm>
+          <a:prstGeom prst="rect">
+            <a:avLst/>
+          </a:prstGeom>
+          <a:noFill/>
+        </p:spPr>
+        <p:txBody>
+          <a:bodyPr wrap="square" rtlCol="0">
+            <a:spAutoFit/>
+          </a:bodyPr>
+          <a:lstStyle/>
+          <a:p>
+            <a:pPr algn="ctr"/>
+            <a:r>
+              <a:rPr lang="en-US" sz="3889" b="1" u="sng" smtClean="0"/>
+              <a:t>Mouse</a:t>
+            </a:r>
+            <a:r>
+              <a:rPr lang="en-US" sz="3889" b="1" u="sng" smtClean="0"/>
+              <a:t> </a:t>
+            </a:r>
+            <a:r>
+              <a:rPr lang="en-US" sz="3889" b="1" u="sng" dirty="0" smtClean="0"/>
+              <a:t>Won!</a:t>
+            </a:r>
+            <a:endParaRPr lang="en-US" sz="3889" b="1" u="sng" dirty="0"/>
+          </a:p>
+        </p:txBody>
+      </p:sp>
+      <p:pic>
+        <p:nvPicPr>
+          <p:cNvPr id="3" name="Picture 2"/>
+          <p:cNvPicPr>
+            <a:picLocks noChangeAspect="1"/>
+          </p:cNvPicPr>
+          <p:nvPr/>
+        </p:nvPicPr>
+        <p:blipFill rotWithShape="1">
+          <a:blip r:embed="rId2">
+            <a:extLst>
+              <a:ext uri="{28A0092B-C50C-407E-A947-70E740481C1C}">
+                <a14:useLocalDpi xmlns:a14="http://schemas.microsoft.com/office/drawing/2010/main" val="0"/>
+              </a:ext>
+            </a:extLst>
+          </a:blip>
+          <a:srcRect r="13045" b="83714"/>
+          <a:stretch/>
+        </p:blipFill>
+        <p:spPr>
+          <a:xfrm>
+            <a:off x="0" y="55821"/>
+            <a:ext cx="5717406" cy="796228"/>
+          </a:xfrm>
+          <a:prstGeom prst="rect">
+            <a:avLst/>
+          </a:prstGeom>
+        </p:spPr>
+      </p:pic>
+      <p:pic>
+        <p:nvPicPr>
+          <p:cNvPr id="11" name="Picture 10"/>
+          <p:cNvPicPr>
+            <a:picLocks noChangeAspect="1"/>
+          </p:cNvPicPr>
+          <p:nvPr/>
+        </p:nvPicPr>
+        <p:blipFill rotWithShape="1">
+          <a:blip r:embed="rId2">
+            <a:extLst>
+              <a:ext uri="{28A0092B-C50C-407E-A947-70E740481C1C}">
+                <a14:useLocalDpi xmlns:a14="http://schemas.microsoft.com/office/drawing/2010/main" val="0"/>
+              </a:ext>
+            </a:extLst>
+          </a:blip>
+          <a:srcRect l="86617" b="83714"/>
+          <a:stretch/>
+        </p:blipFill>
+        <p:spPr>
+          <a:xfrm>
+            <a:off x="6706962" y="89598"/>
+            <a:ext cx="879935" cy="796228"/>
+          </a:xfrm>
+          <a:prstGeom prst="rect">
+            <a:avLst/>
+          </a:prstGeom>
+        </p:spPr>
+      </p:pic>
+      <p:pic>
+        <p:nvPicPr>
+          <p:cNvPr id="12" name="Picture 11"/>
+          <p:cNvPicPr>
+            <a:picLocks noChangeAspect="1"/>
+          </p:cNvPicPr>
+          <p:nvPr/>
+        </p:nvPicPr>
+        <p:blipFill rotWithShape="1">
+          <a:blip r:embed="rId2">
+            <a:extLst>
+              <a:ext uri="{28A0092B-C50C-407E-A947-70E740481C1C}">
+                <a14:useLocalDpi xmlns:a14="http://schemas.microsoft.com/office/drawing/2010/main" val="0"/>
+              </a:ext>
+            </a:extLst>
+          </a:blip>
+          <a:srcRect l="72675" r="13045" b="83714"/>
+          <a:stretch/>
+        </p:blipFill>
+        <p:spPr>
+          <a:xfrm>
+            <a:off x="5742703" y="79803"/>
+            <a:ext cx="938961" cy="796228"/>
+          </a:xfrm>
+          <a:prstGeom prst="rect">
+            <a:avLst/>
+          </a:prstGeom>
+        </p:spPr>
+      </p:pic>
+      <p:pic>
+        <p:nvPicPr>
+          <p:cNvPr id="13" name="Picture 12"/>
+          <p:cNvPicPr>
+            <a:picLocks noChangeAspect="1"/>
+          </p:cNvPicPr>
+          <p:nvPr/>
+        </p:nvPicPr>
+        <p:blipFill rotWithShape="1">
+          <a:blip r:embed="rId2">
+            <a:extLst>
+              <a:ext uri="{28A0092B-C50C-407E-A947-70E740481C1C}">
+                <a14:useLocalDpi xmlns:a14="http://schemas.microsoft.com/office/drawing/2010/main" val="0"/>
+              </a:ext>
+            </a:extLst>
+          </a:blip>
+          <a:srcRect l="12156" r="13045" b="83714"/>
+          <a:stretch/>
+        </p:blipFill>
+        <p:spPr>
+          <a:xfrm rot="16200000">
+            <a:off x="-1934697" y="2958047"/>
+            <a:ext cx="4918129" cy="796228"/>
+          </a:xfrm>
+          <a:prstGeom prst="rect">
+            <a:avLst/>
+          </a:prstGeom>
+        </p:spPr>
+      </p:pic>
+      <p:pic>
+        <p:nvPicPr>
+          <p:cNvPr id="14" name="Picture 13"/>
+          <p:cNvPicPr>
+            <a:picLocks noChangeAspect="1"/>
+          </p:cNvPicPr>
+          <p:nvPr/>
+        </p:nvPicPr>
+        <p:blipFill rotWithShape="1">
+          <a:blip r:embed="rId2">
+            <a:extLst>
+              <a:ext uri="{28A0092B-C50C-407E-A947-70E740481C1C}">
+                <a14:useLocalDpi xmlns:a14="http://schemas.microsoft.com/office/drawing/2010/main" val="0"/>
+              </a:ext>
+            </a:extLst>
+          </a:blip>
+          <a:srcRect l="12156" r="13045" b="83714"/>
+          <a:stretch/>
+        </p:blipFill>
+        <p:spPr>
+          <a:xfrm rot="5400000">
+            <a:off x="4687865" y="3033445"/>
+            <a:ext cx="4918129" cy="796228"/>
+          </a:xfrm>
+          <a:prstGeom prst="rect">
+            <a:avLst/>
+          </a:prstGeom>
+        </p:spPr>
+      </p:pic>
+      <p:pic>
+        <p:nvPicPr>
+          <p:cNvPr id="15" name="Picture 14"/>
+          <p:cNvPicPr>
+            <a:picLocks noChangeAspect="1"/>
+          </p:cNvPicPr>
+          <p:nvPr/>
+        </p:nvPicPr>
+        <p:blipFill rotWithShape="1">
+          <a:blip r:embed="rId2">
+            <a:extLst>
+              <a:ext uri="{28A0092B-C50C-407E-A947-70E740481C1C}">
+                <a14:useLocalDpi xmlns:a14="http://schemas.microsoft.com/office/drawing/2010/main" val="0"/>
+              </a:ext>
+            </a:extLst>
+          </a:blip>
+          <a:srcRect l="12156" r="13045" b="83714"/>
+          <a:stretch/>
+        </p:blipFill>
+        <p:spPr>
+          <a:xfrm rot="10800000">
+            <a:off x="1019176" y="6741865"/>
+            <a:ext cx="4918129" cy="796228"/>
+          </a:xfrm>
+          <a:prstGeom prst="rect">
+            <a:avLst/>
+          </a:prstGeom>
+        </p:spPr>
+      </p:pic>
+      <p:pic>
+        <p:nvPicPr>
+          <p:cNvPr id="16" name="Picture 15"/>
+          <p:cNvPicPr>
+            <a:picLocks noChangeAspect="1"/>
+          </p:cNvPicPr>
+          <p:nvPr/>
+        </p:nvPicPr>
+        <p:blipFill rotWithShape="1">
+          <a:blip r:embed="rId2">
+            <a:extLst>
+              <a:ext uri="{28A0092B-C50C-407E-A947-70E740481C1C}">
+                <a14:useLocalDpi xmlns:a14="http://schemas.microsoft.com/office/drawing/2010/main" val="0"/>
+              </a:ext>
+            </a:extLst>
+          </a:blip>
+          <a:srcRect l="72675" r="13045" b="83714"/>
+          <a:stretch/>
+        </p:blipFill>
+        <p:spPr>
+          <a:xfrm rot="16200000">
+            <a:off x="67537" y="5874270"/>
+            <a:ext cx="938961" cy="796228"/>
+          </a:xfrm>
+          <a:prstGeom prst="rect">
+            <a:avLst/>
+          </a:prstGeom>
+        </p:spPr>
+      </p:pic>
+      <p:pic>
+        <p:nvPicPr>
+          <p:cNvPr id="17" name="Picture 16"/>
+          <p:cNvPicPr>
+            <a:picLocks noChangeAspect="1"/>
+          </p:cNvPicPr>
+          <p:nvPr/>
+        </p:nvPicPr>
+        <p:blipFill rotWithShape="1">
+          <a:blip r:embed="rId2">
+            <a:extLst>
+              <a:ext uri="{28A0092B-C50C-407E-A947-70E740481C1C}">
+                <a14:useLocalDpi xmlns:a14="http://schemas.microsoft.com/office/drawing/2010/main" val="0"/>
+              </a:ext>
+            </a:extLst>
+          </a:blip>
+          <a:srcRect l="72675" r="13045" b="83714"/>
+          <a:stretch/>
+        </p:blipFill>
+        <p:spPr>
+          <a:xfrm rot="10800000">
+            <a:off x="5905896" y="6747773"/>
+            <a:ext cx="938961" cy="796228"/>
+          </a:xfrm>
+          <a:prstGeom prst="rect">
+            <a:avLst/>
+          </a:prstGeom>
+        </p:spPr>
+      </p:pic>
+      <p:pic>
+        <p:nvPicPr>
+          <p:cNvPr id="18" name="Picture 17"/>
+          <p:cNvPicPr>
+            <a:picLocks noChangeAspect="1"/>
+          </p:cNvPicPr>
+          <p:nvPr/>
+        </p:nvPicPr>
+        <p:blipFill rotWithShape="1">
+          <a:blip r:embed="rId2">
+            <a:extLst>
+              <a:ext uri="{28A0092B-C50C-407E-A947-70E740481C1C}">
+                <a14:useLocalDpi xmlns:a14="http://schemas.microsoft.com/office/drawing/2010/main" val="0"/>
+              </a:ext>
+            </a:extLst>
+          </a:blip>
+          <a:srcRect l="72675" r="13045" b="83714"/>
+          <a:stretch/>
+        </p:blipFill>
+        <p:spPr>
+          <a:xfrm rot="5400000">
+            <a:off x="6677448" y="5921084"/>
+            <a:ext cx="938961" cy="796228"/>
+          </a:xfrm>
+          <a:prstGeom prst="rect">
+            <a:avLst/>
+          </a:prstGeom>
+        </p:spPr>
+      </p:pic>
+      <p:pic>
+        <p:nvPicPr>
+          <p:cNvPr id="19" name="Picture 18"/>
+          <p:cNvPicPr>
+            <a:picLocks noChangeAspect="1"/>
+          </p:cNvPicPr>
+          <p:nvPr/>
+        </p:nvPicPr>
+        <p:blipFill rotWithShape="1">
+          <a:blip r:embed="rId2">
+            <a:extLst>
+              <a:ext uri="{28A0092B-C50C-407E-A947-70E740481C1C}">
+                <a14:useLocalDpi xmlns:a14="http://schemas.microsoft.com/office/drawing/2010/main" val="0"/>
+              </a:ext>
+            </a:extLst>
+          </a:blip>
+          <a:srcRect l="86617" b="83714"/>
+          <a:stretch/>
+        </p:blipFill>
+        <p:spPr>
+          <a:xfrm>
+            <a:off x="6736226" y="6788679"/>
+            <a:ext cx="879935" cy="796228"/>
+          </a:xfrm>
+          <a:prstGeom prst="rect">
+            <a:avLst/>
+          </a:prstGeom>
+        </p:spPr>
+      </p:pic>
+      <p:pic>
+        <p:nvPicPr>
+          <p:cNvPr id="20" name="Picture 19"/>
+          <p:cNvPicPr>
+            <a:picLocks noChangeAspect="1"/>
+          </p:cNvPicPr>
+          <p:nvPr/>
+        </p:nvPicPr>
+        <p:blipFill rotWithShape="1">
+          <a:blip r:embed="rId2">
+            <a:extLst>
+              <a:ext uri="{28A0092B-C50C-407E-A947-70E740481C1C}">
+                <a14:useLocalDpi xmlns:a14="http://schemas.microsoft.com/office/drawing/2010/main" val="0"/>
+              </a:ext>
+            </a:extLst>
+          </a:blip>
+          <a:srcRect l="86617" b="83714"/>
+          <a:stretch/>
+        </p:blipFill>
+        <p:spPr>
+          <a:xfrm>
+            <a:off x="-2827" y="6822425"/>
+            <a:ext cx="879935" cy="796228"/>
+          </a:xfrm>
+          <a:prstGeom prst="rect">
+            <a:avLst/>
+          </a:prstGeom>
+        </p:spPr>
+      </p:pic>
+      <p:sp>
+        <p:nvSpPr>
+          <p:cNvPr id="21" name="TextBox 20"/>
+          <p:cNvSpPr txBox="1"/>
+          <p:nvPr/>
+        </p:nvSpPr>
+        <p:spPr>
+          <a:xfrm>
+            <a:off x="960431" y="6030582"/>
+            <a:ext cx="3357978" cy="690830"/>
+          </a:xfrm>
+          <a:prstGeom prst="rect">
+            <a:avLst/>
+          </a:prstGeom>
+          <a:solidFill>
+            <a:schemeClr val="bg1"/>
+          </a:solidFill>
+          <a:ln>
+            <a:solidFill>
+              <a:schemeClr val="tx1"/>
+            </a:solidFill>
+          </a:ln>
+        </p:spPr>
+        <p:txBody>
+          <a:bodyPr wrap="square" rtlCol="0">
+            <a:spAutoFit/>
+          </a:bodyPr>
+          <a:lstStyle/>
+          <a:p>
+            <a:pPr algn="ctr"/>
+            <a:r>
+              <a:rPr lang="en-US" sz="3889" b="1" dirty="0" smtClean="0"/>
+              <a:t>EXIT</a:t>
+            </a:r>
+            <a:endParaRPr lang="en-US" sz="3889" b="1" dirty="0"/>
+          </a:p>
+        </p:txBody>
+      </p:sp>
+      <p:sp>
+        <p:nvSpPr>
+          <p:cNvPr id="22" name="TextBox 21"/>
+          <p:cNvSpPr txBox="1"/>
+          <p:nvPr/>
+        </p:nvSpPr>
+        <p:spPr>
+          <a:xfrm>
+            <a:off x="4460476" y="6030582"/>
+            <a:ext cx="2568973" cy="707886"/>
+          </a:xfrm>
+          <a:prstGeom prst="rect">
+            <a:avLst/>
+          </a:prstGeom>
+          <a:solidFill>
+            <a:schemeClr val="bg1"/>
+          </a:solidFill>
+          <a:ln>
+            <a:solidFill>
+              <a:schemeClr val="tx1"/>
+            </a:solidFill>
+          </a:ln>
+        </p:spPr>
+        <p:txBody>
+          <a:bodyPr wrap="square" rtlCol="0">
+            <a:spAutoFit/>
+          </a:bodyPr>
+          <a:lstStyle/>
+          <a:p>
+            <a:pPr algn="ctr"/>
+            <a:r>
+              <a:rPr lang="en-US" sz="4000" b="1" dirty="0" smtClean="0"/>
+              <a:t>PLAY</a:t>
+            </a:r>
+            <a:r>
+              <a:rPr lang="en-US" sz="3600" b="1" dirty="0" smtClean="0"/>
+              <a:t> AGAIN</a:t>
+            </a:r>
+            <a:endParaRPr lang="en-US" sz="3600" b="1" dirty="0"/>
+          </a:p>
+        </p:txBody>
+      </p:sp>
+    </p:spTree>
+    <p:extLst>
+      <p:ext uri="{BB962C8B-B14F-4D97-AF65-F5344CB8AC3E}">
+        <p14:creationId xmlns:p14="http://schemas.microsoft.com/office/powerpoint/2010/main" val="1621025082"/>
       </p:ext>
     </p:extLst>
   </p:cSld>

</xml_diff>